<commit_message>
small check to design
</commit_message>
<xml_diff>
--- a/design_doc/Editor_Portal_Admin_MockUp.pptx
+++ b/design_doc/Editor_Portal_Admin_MockUp.pptx
@@ -290,7 +290,7 @@
           <a:p>
             <a:fld id="{C6413A72-5B88-8E47-BDC1-496CA61FD11D}" type="datetimeFigureOut">
               <a:rPr lang="en-US" smtClean="0"/>
-              <a:t>11/12/15</a:t>
+              <a:t>11/30/15</a:t>
             </a:fld>
             <a:endParaRPr lang="en-US"/>
           </a:p>
@@ -460,7 +460,7 @@
           <a:p>
             <a:fld id="{C6413A72-5B88-8E47-BDC1-496CA61FD11D}" type="datetimeFigureOut">
               <a:rPr lang="en-US" smtClean="0"/>
-              <a:t>11/12/15</a:t>
+              <a:t>11/30/15</a:t>
             </a:fld>
             <a:endParaRPr lang="en-US"/>
           </a:p>
@@ -640,7 +640,7 @@
           <a:p>
             <a:fld id="{C6413A72-5B88-8E47-BDC1-496CA61FD11D}" type="datetimeFigureOut">
               <a:rPr lang="en-US" smtClean="0"/>
-              <a:t>11/12/15</a:t>
+              <a:t>11/30/15</a:t>
             </a:fld>
             <a:endParaRPr lang="en-US"/>
           </a:p>
@@ -810,7 +810,7 @@
           <a:p>
             <a:fld id="{C6413A72-5B88-8E47-BDC1-496CA61FD11D}" type="datetimeFigureOut">
               <a:rPr lang="en-US" smtClean="0"/>
-              <a:t>11/12/15</a:t>
+              <a:t>11/30/15</a:t>
             </a:fld>
             <a:endParaRPr lang="en-US"/>
           </a:p>
@@ -1056,7 +1056,7 @@
           <a:p>
             <a:fld id="{C6413A72-5B88-8E47-BDC1-496CA61FD11D}" type="datetimeFigureOut">
               <a:rPr lang="en-US" smtClean="0"/>
-              <a:t>11/12/15</a:t>
+              <a:t>11/30/15</a:t>
             </a:fld>
             <a:endParaRPr lang="en-US"/>
           </a:p>
@@ -1344,7 +1344,7 @@
           <a:p>
             <a:fld id="{C6413A72-5B88-8E47-BDC1-496CA61FD11D}" type="datetimeFigureOut">
               <a:rPr lang="en-US" smtClean="0"/>
-              <a:t>11/12/15</a:t>
+              <a:t>11/30/15</a:t>
             </a:fld>
             <a:endParaRPr lang="en-US"/>
           </a:p>
@@ -1766,7 +1766,7 @@
           <a:p>
             <a:fld id="{C6413A72-5B88-8E47-BDC1-496CA61FD11D}" type="datetimeFigureOut">
               <a:rPr lang="en-US" smtClean="0"/>
-              <a:t>11/12/15</a:t>
+              <a:t>11/30/15</a:t>
             </a:fld>
             <a:endParaRPr lang="en-US"/>
           </a:p>
@@ -1884,7 +1884,7 @@
           <a:p>
             <a:fld id="{C6413A72-5B88-8E47-BDC1-496CA61FD11D}" type="datetimeFigureOut">
               <a:rPr lang="en-US" smtClean="0"/>
-              <a:t>11/12/15</a:t>
+              <a:t>11/30/15</a:t>
             </a:fld>
             <a:endParaRPr lang="en-US"/>
           </a:p>
@@ -1979,7 +1979,7 @@
           <a:p>
             <a:fld id="{C6413A72-5B88-8E47-BDC1-496CA61FD11D}" type="datetimeFigureOut">
               <a:rPr lang="en-US" smtClean="0"/>
-              <a:t>11/12/15</a:t>
+              <a:t>11/30/15</a:t>
             </a:fld>
             <a:endParaRPr lang="en-US"/>
           </a:p>
@@ -2256,7 +2256,7 @@
           <a:p>
             <a:fld id="{C6413A72-5B88-8E47-BDC1-496CA61FD11D}" type="datetimeFigureOut">
               <a:rPr lang="en-US" smtClean="0"/>
-              <a:t>11/12/15</a:t>
+              <a:t>11/30/15</a:t>
             </a:fld>
             <a:endParaRPr lang="en-US"/>
           </a:p>
@@ -2509,7 +2509,7 @@
           <a:p>
             <a:fld id="{C6413A72-5B88-8E47-BDC1-496CA61FD11D}" type="datetimeFigureOut">
               <a:rPr lang="en-US" smtClean="0"/>
-              <a:t>11/12/15</a:t>
+              <a:t>11/30/15</a:t>
             </a:fld>
             <a:endParaRPr lang="en-US"/>
           </a:p>
@@ -2722,7 +2722,7 @@
           <a:p>
             <a:fld id="{C6413A72-5B88-8E47-BDC1-496CA61FD11D}" type="datetimeFigureOut">
               <a:rPr lang="en-US" smtClean="0"/>
-              <a:t>11/12/15</a:t>
+              <a:t>11/30/15</a:t>
             </a:fld>
             <a:endParaRPr lang="en-US"/>
           </a:p>
@@ -5080,7 +5080,11 @@
               <a:pPr algn="ctr"/>
               <a:r>
                 <a:rPr lang="en-US" sz="1000" dirty="0" smtClean="0"/>
-                <a:t> (drop-down) *</a:t>
+                <a:t> (drop-down</a:t>
+              </a:r>
+              <a:r>
+                <a:rPr lang="en-US" sz="1000" smtClean="0"/>
+                <a:t>) </a:t>
               </a:r>
               <a:endParaRPr lang="en-US" sz="1000" dirty="0"/>
             </a:p>

</xml_diff>